<commit_message>
matching colors between ppt and html
</commit_message>
<xml_diff>
--- a/presentations/councilSciencePub2013.pptx
+++ b/presentations/councilSciencePub2013.pptx
@@ -3103,7 +3103,7 @@
         </p:nvSpPr>
         <p:spPr>
           <a:xfrm>
-            <a:off x="646499" y="786953"/>
+            <a:off x="646499" y="1035461"/>
             <a:ext cx="7769875" cy="4955203"/>
           </a:xfrm>
           <a:prstGeom prst="rect">
@@ -3118,64 +3118,112 @@
           <a:lstStyle/>
           <a:p>
             <a:r>
-              <a:rPr lang="en-US" sz="4400" dirty="0" smtClean="0"/>
+              <a:rPr lang="en-US" sz="4400" dirty="0" smtClean="0">
+                <a:solidFill>
+                  <a:srgbClr val="558ED5"/>
+                </a:solidFill>
+              </a:rPr>
               <a:t>Scientific Journals as App Stores?</a:t>
             </a:r>
           </a:p>
           <a:p>
             <a:r>
-              <a:rPr lang="en-US" sz="2800" dirty="0" smtClean="0"/>
+              <a:rPr lang="en-US" sz="2800" dirty="0" smtClean="0">
+                <a:solidFill>
+                  <a:srgbClr val="558ED5"/>
+                </a:solidFill>
+              </a:rPr>
               <a:t>Manuscripts as Literate Programs</a:t>
             </a:r>
-            <a:endParaRPr lang="en-US" sz="2800" dirty="0"/>
-          </a:p>
-          <a:p>
-            <a:endParaRPr lang="en-US" sz="2800" dirty="0" smtClean="0"/>
-          </a:p>
-          <a:p>
-            <a:r>
-              <a:rPr lang="en-US" sz="2000" i="1" dirty="0" smtClean="0"/>
+            <a:endParaRPr lang="en-US" sz="2800" dirty="0">
+              <a:solidFill>
+                <a:srgbClr val="558ED5"/>
+              </a:solidFill>
+            </a:endParaRPr>
+          </a:p>
+          <a:p>
+            <a:endParaRPr lang="en-US" sz="2800" dirty="0" smtClean="0">
+              <a:solidFill>
+                <a:srgbClr val="558ED5"/>
+              </a:solidFill>
+            </a:endParaRPr>
+          </a:p>
+          <a:p>
+            <a:r>
+              <a:rPr lang="en-US" sz="2000" i="1" dirty="0" smtClean="0">
+                <a:solidFill>
+                  <a:srgbClr val="558ED5"/>
+                </a:solidFill>
+              </a:rPr>
               <a:t>Jonas S Almeida, Professor, Director</a:t>
             </a:r>
           </a:p>
           <a:p>
             <a:r>
-              <a:rPr lang="en-US" sz="2000" i="1" dirty="0" err="1" smtClean="0"/>
+              <a:rPr lang="en-US" sz="2000" i="1" dirty="0" err="1" smtClean="0">
+                <a:solidFill>
+                  <a:srgbClr val="558ED5"/>
+                </a:solidFill>
+              </a:rPr>
               <a:t>Div</a:t>
             </a:r>
             <a:r>
-              <a:rPr lang="en-US" sz="2000" i="1" dirty="0" smtClean="0"/>
+              <a:rPr lang="en-US" sz="2000" i="1" dirty="0" smtClean="0">
+                <a:solidFill>
+                  <a:srgbClr val="558ED5"/>
+                </a:solidFill>
+              </a:rPr>
               <a:t> Informatics, </a:t>
             </a:r>
             <a:r>
-              <a:rPr lang="en-US" sz="2000" i="1" dirty="0" err="1" smtClean="0"/>
+              <a:rPr lang="en-US" sz="2000" i="1" dirty="0" err="1" smtClean="0">
+                <a:solidFill>
+                  <a:srgbClr val="558ED5"/>
+                </a:solidFill>
+              </a:rPr>
               <a:t>Dept</a:t>
             </a:r>
             <a:r>
-              <a:rPr lang="en-US" sz="2000" i="1" dirty="0" smtClean="0"/>
+              <a:rPr lang="en-US" sz="2000" i="1" dirty="0" smtClean="0">
+                <a:solidFill>
+                  <a:srgbClr val="558ED5"/>
+                </a:solidFill>
+              </a:rPr>
               <a:t> Pathology, </a:t>
             </a:r>
           </a:p>
           <a:p>
             <a:r>
-              <a:rPr lang="en-US" sz="2000" i="1" dirty="0" smtClean="0"/>
+              <a:rPr lang="en-US" sz="2000" i="1" dirty="0" smtClean="0">
+                <a:solidFill>
+                  <a:srgbClr val="558ED5"/>
+                </a:solidFill>
+              </a:rPr>
               <a:t>University of Alabama at Birmingham</a:t>
             </a:r>
           </a:p>
           <a:p>
             <a:r>
-              <a:rPr lang="en-US" sz="2000" i="1" dirty="0" smtClean="0"/>
+              <a:rPr lang="en-US" sz="2000" i="1" dirty="0" smtClean="0">
+                <a:solidFill>
+                  <a:srgbClr val="558ED5"/>
+                </a:solidFill>
+              </a:rPr>
               <a:t>http://</a:t>
             </a:r>
             <a:r>
-              <a:rPr lang="en-US" sz="2000" i="1" dirty="0" err="1" smtClean="0"/>
-              <a:t>jonasalmeida.inf</a:t>
-            </a:r>
-            <a:r>
-              <a:rPr lang="en-US" sz="2400" i="1" dirty="0" err="1" smtClean="0"/>
-              <a:t>o</a:t>
-            </a:r>
-            <a:endParaRPr lang="en-US" sz="2400" i="1" dirty="0" smtClean="0"/>
+              <a:rPr lang="en-US" sz="2000" i="1" dirty="0" err="1" smtClean="0">
+                <a:solidFill>
+                  <a:srgbClr val="558ED5"/>
+                </a:solidFill>
+              </a:rPr>
+              <a:t>jonasalmeida.info</a:t>
+            </a:r>
+            <a:endParaRPr lang="en-US" sz="2400" i="1" dirty="0" smtClean="0">
+              <a:solidFill>
+                <a:srgbClr val="558ED5"/>
+              </a:solidFill>
+            </a:endParaRPr>
           </a:p>
           <a:p>
             <a:endParaRPr lang="en-US" sz="2800" dirty="0" smtClean="0"/>
@@ -3215,7 +3263,7 @@
         </p:nvCxnSpPr>
         <p:spPr>
           <a:xfrm flipV="1">
-            <a:off x="646499" y="579845"/>
+            <a:off x="646499" y="828353"/>
             <a:ext cx="7898714" cy="13806"/>
           </a:xfrm>
           <a:prstGeom prst="line">
@@ -3245,7 +3293,7 @@
         </p:nvCxnSpPr>
         <p:spPr>
           <a:xfrm flipV="1">
-            <a:off x="646499" y="3976593"/>
+            <a:off x="646499" y="4225101"/>
             <a:ext cx="7898714" cy="13806"/>
           </a:xfrm>
           <a:prstGeom prst="line">
@@ -3267,6 +3315,64 @@
           </a:fontRef>
         </p:style>
       </p:cxnSp>
+      <p:sp>
+        <p:nvSpPr>
+          <p:cNvPr id="9" name="TextBox 8"/>
+          <p:cNvSpPr txBox="1"/>
+          <p:nvPr/>
+        </p:nvSpPr>
+        <p:spPr>
+          <a:xfrm>
+            <a:off x="674109" y="514245"/>
+            <a:ext cx="7891904" cy="338554"/>
+          </a:xfrm>
+          <a:prstGeom prst="rect">
+            <a:avLst/>
+          </a:prstGeom>
+          <a:noFill/>
+        </p:spPr>
+        <p:txBody>
+          <a:bodyPr wrap="none" rtlCol="0">
+            <a:spAutoFit/>
+          </a:bodyPr>
+          <a:lstStyle/>
+          <a:p>
+            <a:r>
+              <a:rPr lang="en-US" sz="1600" i="1" dirty="0" smtClean="0">
+                <a:solidFill>
+                  <a:schemeClr val="tx2">
+                    <a:lumMod val="60000"/>
+                    <a:lumOff val="40000"/>
+                  </a:schemeClr>
+                </a:solidFill>
+              </a:rPr>
+              <a:t>H</a:t>
+            </a:r>
+            <a:r>
+              <a:rPr lang="en-US" sz="1600" i="1" smtClean="0">
+                <a:solidFill>
+                  <a:schemeClr val="tx2">
+                    <a:lumMod val="60000"/>
+                    <a:lumOff val="40000"/>
+                  </a:schemeClr>
+                </a:solidFill>
+              </a:rPr>
+              <a:t>ow </a:t>
+            </a:r>
+            <a:r>
+              <a:rPr lang="en-US" sz="1600" i="1" dirty="0">
+                <a:solidFill>
+                  <a:schemeClr val="tx2">
+                    <a:lumMod val="60000"/>
+                    <a:lumOff val="40000"/>
+                  </a:schemeClr>
+                </a:solidFill>
+              </a:rPr>
+              <a:t>journals can integrate more interactive computation applications into their publications</a:t>
+            </a:r>
+          </a:p>
+        </p:txBody>
+      </p:sp>
     </p:spTree>
     <p:extLst>
       <p:ext uri="{BB962C8B-B14F-4D97-AF65-F5344CB8AC3E}">
@@ -3277,6 +3383,13 @@
   <p:clrMapOvr>
     <a:masterClrMapping/>
   </p:clrMapOvr>
+  <p:timing>
+    <p:tnLst>
+      <p:par>
+        <p:cTn xmlns:p14="http://schemas.microsoft.com/office/powerpoint/2010/main" id="1" dur="indefinite" restart="never" nodeType="tmRoot"/>
+      </p:par>
+    </p:tnLst>
+  </p:timing>
 </p:sld>
 </file>
 

</xml_diff>

<commit_message>
small typo in title
</commit_message>
<xml_diff>
--- a/presentations/councilSciencePub2013.pptx
+++ b/presentations/councilSciencePub2013.pptx
@@ -3243,7 +3243,11 @@
           <a:p>
             <a:r>
               <a:rPr lang="en-US" sz="2400" dirty="0" smtClean="0"/>
-              <a:t>lets continue at </a:t>
+              <a:t>Let’s </a:t>
+            </a:r>
+            <a:r>
+              <a:rPr lang="en-US" sz="2400" dirty="0" smtClean="0"/>
+              <a:t>continue at </a:t>
             </a:r>
             <a:r>
               <a:rPr lang="en-US" sz="2400" dirty="0" smtClean="0">

</xml_diff>

<commit_message>
council of science publishers Toronto May 2013
</commit_message>
<xml_diff>
--- a/presentations/councilSciencePub2013.pptx
+++ b/presentations/councilSciencePub2013.pptx
@@ -288,7 +288,7 @@
           <a:p>
             <a:fld id="{D4C73DA3-BC83-4849-9C4F-89092F2BFD70}" type="datetimeFigureOut">
               <a:rPr lang="en-US" smtClean="0"/>
-              <a:t>4/1/13</a:t>
+              <a:t>4/28/13</a:t>
             </a:fld>
             <a:endParaRPr lang="en-US"/>
           </a:p>
@@ -458,7 +458,7 @@
           <a:p>
             <a:fld id="{D4C73DA3-BC83-4849-9C4F-89092F2BFD70}" type="datetimeFigureOut">
               <a:rPr lang="en-US" smtClean="0"/>
-              <a:t>4/1/13</a:t>
+              <a:t>4/28/13</a:t>
             </a:fld>
             <a:endParaRPr lang="en-US"/>
           </a:p>
@@ -638,7 +638,7 @@
           <a:p>
             <a:fld id="{D4C73DA3-BC83-4849-9C4F-89092F2BFD70}" type="datetimeFigureOut">
               <a:rPr lang="en-US" smtClean="0"/>
-              <a:t>4/1/13</a:t>
+              <a:t>4/28/13</a:t>
             </a:fld>
             <a:endParaRPr lang="en-US"/>
           </a:p>
@@ -808,7 +808,7 @@
           <a:p>
             <a:fld id="{D4C73DA3-BC83-4849-9C4F-89092F2BFD70}" type="datetimeFigureOut">
               <a:rPr lang="en-US" smtClean="0"/>
-              <a:t>4/1/13</a:t>
+              <a:t>4/28/13</a:t>
             </a:fld>
             <a:endParaRPr lang="en-US"/>
           </a:p>
@@ -1054,7 +1054,7 @@
           <a:p>
             <a:fld id="{D4C73DA3-BC83-4849-9C4F-89092F2BFD70}" type="datetimeFigureOut">
               <a:rPr lang="en-US" smtClean="0"/>
-              <a:t>4/1/13</a:t>
+              <a:t>4/28/13</a:t>
             </a:fld>
             <a:endParaRPr lang="en-US"/>
           </a:p>
@@ -1342,7 +1342,7 @@
           <a:p>
             <a:fld id="{D4C73DA3-BC83-4849-9C4F-89092F2BFD70}" type="datetimeFigureOut">
               <a:rPr lang="en-US" smtClean="0"/>
-              <a:t>4/1/13</a:t>
+              <a:t>4/28/13</a:t>
             </a:fld>
             <a:endParaRPr lang="en-US"/>
           </a:p>
@@ -1764,7 +1764,7 @@
           <a:p>
             <a:fld id="{D4C73DA3-BC83-4849-9C4F-89092F2BFD70}" type="datetimeFigureOut">
               <a:rPr lang="en-US" smtClean="0"/>
-              <a:t>4/1/13</a:t>
+              <a:t>4/28/13</a:t>
             </a:fld>
             <a:endParaRPr lang="en-US"/>
           </a:p>
@@ -1882,7 +1882,7 @@
           <a:p>
             <a:fld id="{D4C73DA3-BC83-4849-9C4F-89092F2BFD70}" type="datetimeFigureOut">
               <a:rPr lang="en-US" smtClean="0"/>
-              <a:t>4/1/13</a:t>
+              <a:t>4/28/13</a:t>
             </a:fld>
             <a:endParaRPr lang="en-US"/>
           </a:p>
@@ -1977,7 +1977,7 @@
           <a:p>
             <a:fld id="{D4C73DA3-BC83-4849-9C4F-89092F2BFD70}" type="datetimeFigureOut">
               <a:rPr lang="en-US" smtClean="0"/>
-              <a:t>4/1/13</a:t>
+              <a:t>4/28/13</a:t>
             </a:fld>
             <a:endParaRPr lang="en-US"/>
           </a:p>
@@ -2254,7 +2254,7 @@
           <a:p>
             <a:fld id="{D4C73DA3-BC83-4849-9C4F-89092F2BFD70}" type="datetimeFigureOut">
               <a:rPr lang="en-US" smtClean="0"/>
-              <a:t>4/1/13</a:t>
+              <a:t>4/28/13</a:t>
             </a:fld>
             <a:endParaRPr lang="en-US"/>
           </a:p>
@@ -2507,7 +2507,7 @@
           <a:p>
             <a:fld id="{D4C73DA3-BC83-4849-9C4F-89092F2BFD70}" type="datetimeFigureOut">
               <a:rPr lang="en-US" smtClean="0"/>
-              <a:t>4/1/13</a:t>
+              <a:t>4/28/13</a:t>
             </a:fld>
             <a:endParaRPr lang="en-US"/>
           </a:p>
@@ -2720,7 +2720,7 @@
           <a:p>
             <a:fld id="{D4C73DA3-BC83-4849-9C4F-89092F2BFD70}" type="datetimeFigureOut">
               <a:rPr lang="en-US" smtClean="0"/>
-              <a:t>4/1/13</a:t>
+              <a:t>4/28/13</a:t>
             </a:fld>
             <a:endParaRPr lang="en-US"/>
           </a:p>
@@ -3243,11 +3243,7 @@
           <a:p>
             <a:r>
               <a:rPr lang="en-US" sz="2400" dirty="0" smtClean="0"/>
-              <a:t>Let’s </a:t>
-            </a:r>
-            <a:r>
-              <a:rPr lang="en-US" sz="2400" dirty="0" smtClean="0"/>
-              <a:t>continue at </a:t>
+              <a:t>Let’s continue at </a:t>
             </a:r>
             <a:r>
               <a:rPr lang="en-US" sz="2400" dirty="0" smtClean="0">
@@ -3328,7 +3324,7 @@
         <p:spPr>
           <a:xfrm>
             <a:off x="674109" y="514245"/>
-            <a:ext cx="7891904" cy="338554"/>
+            <a:ext cx="4580188" cy="338554"/>
           </a:xfrm>
           <a:prstGeom prst="rect">
             <a:avLst/>
@@ -3350,30 +3346,16 @@
                   </a:schemeClr>
                 </a:solidFill>
               </a:rPr>
-              <a:t>H</a:t>
-            </a:r>
-            <a:r>
-              <a:rPr lang="en-US" sz="1600" i="1" smtClean="0">
-                <a:solidFill>
-                  <a:schemeClr val="tx2">
-                    <a:lumMod val="60000"/>
-                    <a:lumOff val="40000"/>
-                  </a:schemeClr>
-                </a:solidFill>
-              </a:rPr>
-              <a:t>ow </a:t>
-            </a:r>
-            <a:r>
-              <a:rPr lang="en-US" sz="1600" i="1" dirty="0">
-                <a:solidFill>
-                  <a:schemeClr val="tx2">
-                    <a:lumMod val="60000"/>
-                    <a:lumOff val="40000"/>
-                  </a:schemeClr>
-                </a:solidFill>
-              </a:rPr>
-              <a:t>journals can integrate more interactive computation applications into their publications</a:t>
-            </a:r>
+              <a:t>Integration of web computing in scientific publishing</a:t>
+            </a:r>
+            <a:endParaRPr lang="en-US" sz="1600" i="1" dirty="0">
+              <a:solidFill>
+                <a:schemeClr val="tx2">
+                  <a:lumMod val="60000"/>
+                  <a:lumOff val="40000"/>
+                </a:schemeClr>
+              </a:solidFill>
+            </a:endParaRPr>
           </a:p>
         </p:txBody>
       </p:sp>

</xml_diff>